<commit_message>
renamed some methods, finished slides
</commit_message>
<xml_diff>
--- a/Observer/Coding-Dojo-2015-05-06.pptx
+++ b/Observer/Coding-Dojo-2015-05-06.pptx
@@ -20,8 +20,9 @@
     <p:sldId id="294" r:id="rId14"/>
     <p:sldId id="295" r:id="rId15"/>
     <p:sldId id="296" r:id="rId16"/>
-    <p:sldId id="297" r:id="rId17"/>
-    <p:sldId id="264" r:id="rId18"/>
+    <p:sldId id="298" r:id="rId17"/>
+    <p:sldId id="297" r:id="rId18"/>
+    <p:sldId id="264" r:id="rId19"/>
   </p:sldIdLst>
   <p:sldSz cx="9144000" cy="6858000" type="screen4x3"/>
   <p:notesSz cx="6858000" cy="9144000"/>
@@ -3131,6 +3132,10 @@
           <a:p>
             <a:pPr lvl="1"/>
             <a:r>
+              <a:rPr lang="de-DE" sz="2000" dirty="0" smtClean="0"/>
+              <a:t>Optional folgende </a:t>
+            </a:r>
+            <a:r>
               <a:rPr lang="de-DE" sz="2000" dirty="0" err="1" smtClean="0"/>
               <a:t>Eclipse-Plug-ins</a:t>
             </a:r>
@@ -3527,7 +3532,7 @@
       </p:grpSpPr>
       <p:pic>
         <p:nvPicPr>
-          <p:cNvPr id="4099" name="Picture 3"/>
+          <p:cNvPr id="2050" name="Picture 2"/>
           <p:cNvPicPr>
             <a:picLocks noChangeAspect="1" noChangeArrowheads="1"/>
           </p:cNvPicPr>
@@ -3548,8 +3553,8 @@
         </p:blipFill>
         <p:spPr bwMode="auto">
           <a:xfrm>
-            <a:off x="755576" y="1124744"/>
-            <a:ext cx="7122600" cy="3672408"/>
+            <a:off x="640456" y="980728"/>
+            <a:ext cx="7459936" cy="3816424"/>
           </a:xfrm>
           <a:prstGeom prst="rect">
             <a:avLst/>
@@ -3649,15 +3654,7 @@
                   <a:schemeClr val="tx2"/>
                 </a:solidFill>
               </a:rPr>
-              <a:t>Siehe TODOs </a:t>
-            </a:r>
-            <a:r>
-              <a:rPr lang="de-DE" sz="2000" dirty="0" smtClean="0">
-                <a:solidFill>
-                  <a:schemeClr val="tx2"/>
-                </a:solidFill>
-              </a:rPr>
-              <a:t>im Code</a:t>
+              <a:t>Siehe TODOs im Code</a:t>
             </a:r>
             <a:endParaRPr lang="de-DE" sz="2000" dirty="0">
               <a:solidFill>
@@ -3839,7 +3836,6 @@
               <a:rPr lang="de-DE" sz="1800" dirty="0" smtClean="0"/>
               <a:t>Implementierung ergänzen, damit über die Factory erzeugte Personen und Anschriften automatisch alle Änderungen ihrer Eigenschaften an die Factory berichten und diese in Folge die save-Methoden aufrufen.</a:t>
             </a:r>
-            <a:endParaRPr lang="de-DE" sz="1800" dirty="0" smtClean="0"/>
           </a:p>
         </p:txBody>
       </p:sp>
@@ -3882,7 +3878,7 @@
       </p:grpSpPr>
       <p:pic>
         <p:nvPicPr>
-          <p:cNvPr id="4099" name="Picture 3"/>
+          <p:cNvPr id="11" name="Picture 2"/>
           <p:cNvPicPr>
             <a:picLocks noChangeAspect="1" noChangeArrowheads="1"/>
           </p:cNvPicPr>
@@ -3903,8 +3899,8 @@
         </p:blipFill>
         <p:spPr bwMode="auto">
           <a:xfrm>
-            <a:off x="755576" y="1124744"/>
-            <a:ext cx="7122600" cy="3672408"/>
+            <a:off x="640456" y="980728"/>
+            <a:ext cx="7459936" cy="3816424"/>
           </a:xfrm>
           <a:prstGeom prst="rect">
             <a:avLst/>
@@ -4131,7 +4127,6 @@
               <a:rPr lang="de-DE" sz="1800" dirty="0" smtClean="0"/>
               <a:t>Implementierung ergänzen, damit über die Factory erzeugte Personen und Anschriften automatisch alle Änderungen ihrer Eigenschaften an die Factory berichten und diese in Folge die save-Methoden aufrufen.</a:t>
             </a:r>
-            <a:endParaRPr lang="de-DE" sz="1800" dirty="0" smtClean="0"/>
           </a:p>
         </p:txBody>
       </p:sp>
@@ -4180,15 +4175,7 @@
                   <a:schemeClr val="tx2"/>
                 </a:solidFill>
               </a:rPr>
-              <a:t>Siehe TODOs </a:t>
-            </a:r>
-            <a:r>
-              <a:rPr lang="de-DE" sz="2000" dirty="0" smtClean="0">
-                <a:solidFill>
-                  <a:schemeClr val="tx2"/>
-                </a:solidFill>
-              </a:rPr>
-              <a:t>im Code</a:t>
+              <a:t>Siehe TODOs im Code</a:t>
             </a:r>
             <a:endParaRPr lang="de-DE" sz="2000" dirty="0">
               <a:solidFill>
@@ -4313,23 +4300,7 @@
                   <a:schemeClr val="tx2"/>
                 </a:solidFill>
               </a:rPr>
-              <a:t>-Tests </a:t>
-            </a:r>
-            <a:r>
-              <a:rPr lang="de-DE" sz="2000" dirty="0" smtClean="0">
-                <a:solidFill>
-                  <a:schemeClr val="tx2"/>
-                </a:solidFill>
-              </a:rPr>
-              <a:t>schon </a:t>
-            </a:r>
-            <a:r>
-              <a:rPr lang="de-DE" sz="2000" dirty="0" smtClean="0">
-                <a:solidFill>
-                  <a:schemeClr val="tx2"/>
-                </a:solidFill>
-              </a:rPr>
-              <a:t>implementiert</a:t>
+              <a:t>-Tests schon implementiert</a:t>
             </a:r>
             <a:endParaRPr lang="de-DE" sz="2000" dirty="0">
               <a:solidFill>
@@ -5028,7 +4999,7 @@
           <a:p>
             <a:r>
               <a:rPr lang="de-DE" dirty="0" smtClean="0"/>
-              <a:t>Zeitplan</a:t>
+              <a:t>Gleiches Spiel, andere Code-Basis</a:t>
             </a:r>
             <a:endParaRPr lang="de-DE" dirty="0"/>
           </a:p>
@@ -5036,183 +5007,365 @@
       </p:sp>
       <p:sp>
         <p:nvSpPr>
-          <p:cNvPr id="3" name="Inhaltsplatzhalter 2"/>
-          <p:cNvSpPr>
-            <a:spLocks noGrp="1"/>
-          </p:cNvSpPr>
-          <p:nvPr>
-            <p:ph idx="1"/>
-          </p:nvPr>
-        </p:nvSpPr>
-        <p:spPr/>
-        <p:txBody>
-          <a:bodyPr>
-            <a:normAutofit fontScale="92500"/>
+          <p:cNvPr id="10" name="Inhaltsplatzhalter 2"/>
+          <p:cNvSpPr txBox="1">
+            <a:spLocks/>
+          </p:cNvSpPr>
+          <p:nvPr/>
+        </p:nvSpPr>
+        <p:spPr>
+          <a:xfrm>
+            <a:off x="457200" y="4941168"/>
+            <a:ext cx="4762871" cy="1584176"/>
+          </a:xfrm>
+          <a:prstGeom prst="rect">
+            <a:avLst/>
+          </a:prstGeom>
+        </p:spPr>
+        <p:txBody>
+          <a:bodyPr vert="horz" lIns="91440" tIns="45720" rIns="91440" bIns="45720" rtlCol="0">
+            <a:normAutofit lnSpcReduction="10000"/>
           </a:bodyPr>
+          <a:lstStyle>
+            <a:lvl1pPr marL="342900" indent="-342900" algn="l" defTabSz="914400" rtl="0" eaLnBrk="1" latinLnBrk="0" hangingPunct="1">
+              <a:spcBef>
+                <a:spcPct val="20000"/>
+              </a:spcBef>
+              <a:buFont typeface="Arial" pitchFamily="34" charset="0"/>
+              <a:buChar char="•"/>
+              <a:defRPr sz="3200" kern="1200">
+                <a:solidFill>
+                  <a:schemeClr val="tx1"/>
+                </a:solidFill>
+                <a:latin typeface="+mn-lt"/>
+                <a:ea typeface="+mn-ea"/>
+                <a:cs typeface="+mn-cs"/>
+              </a:defRPr>
+            </a:lvl1pPr>
+            <a:lvl2pPr marL="742950" indent="-285750" algn="l" defTabSz="914400" rtl="0" eaLnBrk="1" latinLnBrk="0" hangingPunct="1">
+              <a:spcBef>
+                <a:spcPct val="20000"/>
+              </a:spcBef>
+              <a:buFont typeface="Arial" pitchFamily="34" charset="0"/>
+              <a:buChar char="–"/>
+              <a:defRPr sz="2800" kern="1200">
+                <a:solidFill>
+                  <a:schemeClr val="tx1"/>
+                </a:solidFill>
+                <a:latin typeface="+mn-lt"/>
+                <a:ea typeface="+mn-ea"/>
+                <a:cs typeface="+mn-cs"/>
+              </a:defRPr>
+            </a:lvl2pPr>
+            <a:lvl3pPr marL="1143000" indent="-228600" algn="l" defTabSz="914400" rtl="0" eaLnBrk="1" latinLnBrk="0" hangingPunct="1">
+              <a:spcBef>
+                <a:spcPct val="20000"/>
+              </a:spcBef>
+              <a:buFont typeface="Arial" pitchFamily="34" charset="0"/>
+              <a:buChar char="•"/>
+              <a:defRPr sz="2400" kern="1200">
+                <a:solidFill>
+                  <a:schemeClr val="tx1"/>
+                </a:solidFill>
+                <a:latin typeface="+mn-lt"/>
+                <a:ea typeface="+mn-ea"/>
+                <a:cs typeface="+mn-cs"/>
+              </a:defRPr>
+            </a:lvl3pPr>
+            <a:lvl4pPr marL="1600200" indent="-228600" algn="l" defTabSz="914400" rtl="0" eaLnBrk="1" latinLnBrk="0" hangingPunct="1">
+              <a:spcBef>
+                <a:spcPct val="20000"/>
+              </a:spcBef>
+              <a:buFont typeface="Arial" pitchFamily="34" charset="0"/>
+              <a:buChar char="–"/>
+              <a:defRPr sz="2000" kern="1200">
+                <a:solidFill>
+                  <a:schemeClr val="tx1"/>
+                </a:solidFill>
+                <a:latin typeface="+mn-lt"/>
+                <a:ea typeface="+mn-ea"/>
+                <a:cs typeface="+mn-cs"/>
+              </a:defRPr>
+            </a:lvl4pPr>
+            <a:lvl5pPr marL="2057400" indent="-228600" algn="l" defTabSz="914400" rtl="0" eaLnBrk="1" latinLnBrk="0" hangingPunct="1">
+              <a:spcBef>
+                <a:spcPct val="20000"/>
+              </a:spcBef>
+              <a:buFont typeface="Arial" pitchFamily="34" charset="0"/>
+              <a:buChar char="»"/>
+              <a:defRPr sz="2000" kern="1200">
+                <a:solidFill>
+                  <a:schemeClr val="tx1"/>
+                </a:solidFill>
+                <a:latin typeface="+mn-lt"/>
+                <a:ea typeface="+mn-ea"/>
+                <a:cs typeface="+mn-cs"/>
+              </a:defRPr>
+            </a:lvl5pPr>
+            <a:lvl6pPr marL="2514600" indent="-228600" algn="l" defTabSz="914400" rtl="0" eaLnBrk="1" latinLnBrk="0" hangingPunct="1">
+              <a:spcBef>
+                <a:spcPct val="20000"/>
+              </a:spcBef>
+              <a:buFont typeface="Arial" pitchFamily="34" charset="0"/>
+              <a:buChar char="•"/>
+              <a:defRPr sz="2000" kern="1200">
+                <a:solidFill>
+                  <a:schemeClr val="tx1"/>
+                </a:solidFill>
+                <a:latin typeface="+mn-lt"/>
+                <a:ea typeface="+mn-ea"/>
+                <a:cs typeface="+mn-cs"/>
+              </a:defRPr>
+            </a:lvl6pPr>
+            <a:lvl7pPr marL="2971800" indent="-228600" algn="l" defTabSz="914400" rtl="0" eaLnBrk="1" latinLnBrk="0" hangingPunct="1">
+              <a:spcBef>
+                <a:spcPct val="20000"/>
+              </a:spcBef>
+              <a:buFont typeface="Arial" pitchFamily="34" charset="0"/>
+              <a:buChar char="•"/>
+              <a:defRPr sz="2000" kern="1200">
+                <a:solidFill>
+                  <a:schemeClr val="tx1"/>
+                </a:solidFill>
+                <a:latin typeface="+mn-lt"/>
+                <a:ea typeface="+mn-ea"/>
+                <a:cs typeface="+mn-cs"/>
+              </a:defRPr>
+            </a:lvl7pPr>
+            <a:lvl8pPr marL="3429000" indent="-228600" algn="l" defTabSz="914400" rtl="0" eaLnBrk="1" latinLnBrk="0" hangingPunct="1">
+              <a:spcBef>
+                <a:spcPct val="20000"/>
+              </a:spcBef>
+              <a:buFont typeface="Arial" pitchFamily="34" charset="0"/>
+              <a:buChar char="•"/>
+              <a:defRPr sz="2000" kern="1200">
+                <a:solidFill>
+                  <a:schemeClr val="tx1"/>
+                </a:solidFill>
+                <a:latin typeface="+mn-lt"/>
+                <a:ea typeface="+mn-ea"/>
+                <a:cs typeface="+mn-cs"/>
+              </a:defRPr>
+            </a:lvl8pPr>
+            <a:lvl9pPr marL="3886200" indent="-228600" algn="l" defTabSz="914400" rtl="0" eaLnBrk="1" latinLnBrk="0" hangingPunct="1">
+              <a:spcBef>
+                <a:spcPct val="20000"/>
+              </a:spcBef>
+              <a:buFont typeface="Arial" pitchFamily="34" charset="0"/>
+              <a:buChar char="•"/>
+              <a:defRPr sz="2000" kern="1200">
+                <a:solidFill>
+                  <a:schemeClr val="tx1"/>
+                </a:solidFill>
+                <a:latin typeface="+mn-lt"/>
+                <a:ea typeface="+mn-ea"/>
+                <a:cs typeface="+mn-cs"/>
+              </a:defRPr>
+            </a:lvl9pPr>
+          </a:lstStyle>
+          <a:p>
+            <a:pPr marL="0" indent="0">
+              <a:buNone/>
+            </a:pPr>
+            <a:r>
+              <a:rPr lang="de-DE" sz="2000" dirty="0" smtClean="0"/>
+              <a:t>Aufgabe:</a:t>
+            </a:r>
+          </a:p>
+          <a:p>
+            <a:r>
+              <a:rPr lang="de-DE" sz="1800" dirty="0" smtClean="0"/>
+              <a:t>Wie eben</a:t>
+            </a:r>
+          </a:p>
+          <a:p>
+            <a:r>
+              <a:rPr lang="de-DE" sz="1800" dirty="0" smtClean="0"/>
+              <a:t>Projekt: </a:t>
+            </a:r>
+            <a:r>
+              <a:rPr lang="de-DE" sz="1800" dirty="0" err="1" smtClean="0"/>
+              <a:t>ObserverEMFExample</a:t>
+            </a:r>
+            <a:endParaRPr lang="de-DE" sz="1800" dirty="0" smtClean="0"/>
+          </a:p>
+          <a:p>
+            <a:r>
+              <a:rPr lang="de-DE" sz="1800" dirty="0" smtClean="0"/>
+              <a:t>Implementierung basiert auf mit EMF-generiertem Code</a:t>
+            </a:r>
+            <a:endParaRPr lang="de-DE" sz="1800" dirty="0" smtClean="0"/>
+          </a:p>
+        </p:txBody>
+      </p:sp>
+      <p:pic>
+        <p:nvPicPr>
+          <p:cNvPr id="1026" name="Picture 2"/>
+          <p:cNvPicPr>
+            <a:picLocks noChangeAspect="1" noChangeArrowheads="1"/>
+          </p:cNvPicPr>
+          <p:nvPr/>
+        </p:nvPicPr>
+        <p:blipFill>
+          <a:blip r:embed="rId2">
+            <a:extLst>
+              <a:ext uri="{28A0092B-C50C-407E-A947-70E740481C1C}">
+                <a14:useLocalDpi xmlns:a14="http://schemas.microsoft.com/office/drawing/2010/main" val="0"/>
+              </a:ext>
+            </a:extLst>
+          </a:blip>
+          <a:srcRect/>
+          <a:stretch>
+            <a:fillRect/>
+          </a:stretch>
+        </p:blipFill>
+        <p:spPr bwMode="auto">
+          <a:xfrm>
+            <a:off x="729928" y="1157109"/>
+            <a:ext cx="7307611" cy="3568035"/>
+          </a:xfrm>
+          <a:prstGeom prst="rect">
+            <a:avLst/>
+          </a:prstGeom>
+          <a:noFill/>
+          <a:ln>
+            <a:noFill/>
+          </a:ln>
+          <a:extLst>
+            <a:ext uri="{909E8E84-426E-40DD-AFC4-6F175D3DCCD1}">
+              <a14:hiddenFill xmlns:a14="http://schemas.microsoft.com/office/drawing/2010/main">
+                <a:solidFill>
+                  <a:schemeClr val="accent1"/>
+                </a:solidFill>
+              </a14:hiddenFill>
+            </a:ext>
+            <a:ext uri="{91240B29-F687-4F45-9708-019B960494DF}">
+              <a14:hiddenLine xmlns:a14="http://schemas.microsoft.com/office/drawing/2010/main" w="9525">
+                <a:solidFill>
+                  <a:schemeClr val="tx1"/>
+                </a:solidFill>
+                <a:miter lim="800000"/>
+                <a:headEnd/>
+                <a:tailEnd/>
+              </a14:hiddenLine>
+            </a:ext>
+          </a:extLst>
+        </p:spPr>
+      </p:pic>
+      <p:sp>
+        <p:nvSpPr>
+          <p:cNvPr id="9" name="Abgerundetes Rechteck 8"/>
+          <p:cNvSpPr/>
+          <p:nvPr/>
+        </p:nvSpPr>
+        <p:spPr>
+          <a:xfrm rot="21253091">
+            <a:off x="2936424" y="4845246"/>
+            <a:ext cx="2484707" cy="534586"/>
+          </a:xfrm>
+          <a:prstGeom prst="roundRect">
+            <a:avLst/>
+          </a:prstGeom>
+          <a:solidFill>
+            <a:schemeClr val="bg1"/>
+          </a:solidFill>
+        </p:spPr>
+        <p:style>
+          <a:lnRef idx="2">
+            <a:schemeClr val="accent1">
+              <a:shade val="50000"/>
+            </a:schemeClr>
+          </a:lnRef>
+          <a:fillRef idx="1">
+            <a:schemeClr val="accent1"/>
+          </a:fillRef>
+          <a:effectRef idx="0">
+            <a:schemeClr val="accent1"/>
+          </a:effectRef>
+          <a:fontRef idx="minor">
+            <a:schemeClr val="lt1"/>
+          </a:fontRef>
+        </p:style>
+        <p:txBody>
+          <a:bodyPr rtlCol="0" anchor="ctr"/>
           <a:lstStyle/>
           <a:p>
-            <a:pPr marL="514350" indent="-514350">
-              <a:buFont typeface="+mj-lt"/>
-              <a:buAutoNum type="arabicPeriod"/>
-            </a:pPr>
-            <a:r>
-              <a:rPr lang="de-DE" sz="2800" dirty="0" smtClean="0">
-                <a:solidFill>
-                  <a:schemeClr val="bg1">
-                    <a:lumMod val="65000"/>
-                  </a:schemeClr>
+            <a:pPr algn="ctr"/>
+            <a:r>
+              <a:rPr lang="de-DE" sz="2000" dirty="0" smtClean="0">
+                <a:solidFill>
+                  <a:schemeClr val="tx2"/>
                 </a:solidFill>
               </a:rPr>
-              <a:t>Vorstellung des Observer-Musters (ca. 15 Min.)</a:t>
-            </a:r>
-          </a:p>
-          <a:p>
-            <a:pPr marL="914400" lvl="1" indent="-514350">
-              <a:buFont typeface="+mj-lt"/>
-              <a:buAutoNum type="arabicPeriod"/>
-            </a:pPr>
-            <a:endParaRPr lang="de-DE" sz="2400" dirty="0" smtClean="0"/>
-          </a:p>
-          <a:p>
-            <a:pPr marL="514350" indent="-514350">
-              <a:buFont typeface="+mj-lt"/>
-              <a:buAutoNum type="arabicPeriod"/>
-            </a:pPr>
-            <a:r>
-              <a:rPr lang="de-DE" sz="2800" dirty="0" smtClean="0">
-                <a:solidFill>
-                  <a:schemeClr val="bg1">
-                    <a:lumMod val="65000"/>
-                  </a:schemeClr>
+              <a:t>Siehe TODOs im Code</a:t>
+            </a:r>
+            <a:endParaRPr lang="de-DE" sz="2000" dirty="0">
+              <a:solidFill>
+                <a:schemeClr val="tx2"/>
+              </a:solidFill>
+            </a:endParaRPr>
+          </a:p>
+        </p:txBody>
+      </p:sp>
+      <p:sp>
+        <p:nvSpPr>
+          <p:cNvPr id="7" name="Abgerundetes Rechteck 6"/>
+          <p:cNvSpPr/>
+          <p:nvPr/>
+        </p:nvSpPr>
+        <p:spPr>
+          <a:xfrm>
+            <a:off x="5868144" y="5607201"/>
+            <a:ext cx="2725537" cy="919644"/>
+          </a:xfrm>
+          <a:prstGeom prst="roundRect">
+            <a:avLst/>
+          </a:prstGeom>
+          <a:solidFill>
+            <a:schemeClr val="bg1"/>
+          </a:solidFill>
+        </p:spPr>
+        <p:style>
+          <a:lnRef idx="2">
+            <a:schemeClr val="accent1">
+              <a:shade val="50000"/>
+            </a:schemeClr>
+          </a:lnRef>
+          <a:fillRef idx="1">
+            <a:schemeClr val="accent1"/>
+          </a:fillRef>
+          <a:effectRef idx="0">
+            <a:schemeClr val="accent1"/>
+          </a:effectRef>
+          <a:fontRef idx="minor">
+            <a:schemeClr val="lt1"/>
+          </a:fontRef>
+        </p:style>
+        <p:txBody>
+          <a:bodyPr rtlCol="0" anchor="ctr"/>
+          <a:lstStyle/>
+          <a:p>
+            <a:pPr algn="ctr"/>
+            <a:r>
+              <a:rPr lang="de-DE" sz="2000" dirty="0" smtClean="0">
+                <a:solidFill>
+                  <a:schemeClr val="tx2"/>
                 </a:solidFill>
               </a:rPr>
-              <a:t>Muster selbst implementieren</a:t>
-            </a:r>
-          </a:p>
-          <a:p>
-            <a:pPr marL="914400" lvl="1" indent="-514350">
-              <a:buFont typeface="+mj-lt"/>
-              <a:buAutoNum type="alphaLcParenR"/>
-            </a:pPr>
-            <a:r>
-              <a:rPr lang="de-DE" sz="2400" dirty="0" smtClean="0">
-                <a:solidFill>
-                  <a:schemeClr val="bg1">
-                    <a:lumMod val="65000"/>
-                  </a:schemeClr>
-                </a:solidFill>
-              </a:rPr>
-              <a:t>Anwendungsproblem kennenlernen (ca. 5 Min.)</a:t>
-            </a:r>
-          </a:p>
-          <a:p>
-            <a:pPr marL="914400" lvl="1" indent="-514350">
-              <a:buFont typeface="+mj-lt"/>
-              <a:buAutoNum type="alphaLcParenR"/>
-            </a:pPr>
-            <a:r>
-              <a:rPr lang="de-DE" sz="2400" dirty="0" smtClean="0">
-                <a:solidFill>
-                  <a:schemeClr val="bg1">
-                    <a:lumMod val="65000"/>
-                  </a:schemeClr>
-                </a:solidFill>
-              </a:rPr>
-              <a:t>paarweise/einzeln Muster implementieren (ca. 20 Min.)</a:t>
-            </a:r>
-          </a:p>
-          <a:p>
-            <a:pPr marL="914400" lvl="1" indent="-514350">
-              <a:buFont typeface="+mj-lt"/>
-              <a:buAutoNum type="alphaLcParenR"/>
-            </a:pPr>
-            <a:endParaRPr lang="de-DE" sz="2400" dirty="0" smtClean="0"/>
-          </a:p>
-          <a:p>
-            <a:pPr marL="514350" indent="-514350">
-              <a:buFont typeface="+mj-lt"/>
-              <a:buAutoNum type="arabicPeriod"/>
-            </a:pPr>
-            <a:r>
-              <a:rPr lang="de-DE" sz="2800" dirty="0" smtClean="0">
-                <a:solidFill>
-                  <a:schemeClr val="bg1">
-                    <a:lumMod val="65000"/>
-                  </a:schemeClr>
-                </a:solidFill>
-              </a:rPr>
-              <a:t>Diskussion / Vergleich einiger Lösungen (ca. 10 Min.)</a:t>
-            </a:r>
-          </a:p>
-          <a:p>
-            <a:pPr marL="914400" lvl="1" indent="-514350">
-              <a:buFont typeface="+mj-lt"/>
-              <a:buAutoNum type="arabicPeriod"/>
-            </a:pPr>
-            <a:endParaRPr lang="de-DE" sz="2400" dirty="0" smtClean="0"/>
-          </a:p>
-          <a:p>
-            <a:pPr marL="514350" indent="-514350">
-              <a:buFont typeface="+mj-lt"/>
-              <a:buAutoNum type="arabicPeriod"/>
-            </a:pPr>
-            <a:r>
-              <a:rPr lang="de-DE" sz="2800" dirty="0">
-                <a:solidFill>
-                  <a:schemeClr val="bg1">
-                    <a:lumMod val="65000"/>
-                  </a:schemeClr>
-                </a:solidFill>
-              </a:rPr>
-              <a:t>Alternative Implementierung mit EMF (ca. </a:t>
-            </a:r>
-            <a:r>
-              <a:rPr lang="de-DE" sz="2800" dirty="0" smtClean="0">
-                <a:solidFill>
-                  <a:schemeClr val="bg1">
-                    <a:lumMod val="65000"/>
-                  </a:schemeClr>
-                </a:solidFill>
-              </a:rPr>
-              <a:t>20 </a:t>
-            </a:r>
-            <a:r>
-              <a:rPr lang="de-DE" sz="2800" dirty="0">
-                <a:solidFill>
-                  <a:schemeClr val="bg1">
-                    <a:lumMod val="65000"/>
-                  </a:schemeClr>
-                </a:solidFill>
-              </a:rPr>
-              <a:t>Min)</a:t>
-            </a:r>
-          </a:p>
-          <a:p>
-            <a:pPr marL="914400" lvl="1" indent="-514350">
-              <a:buFont typeface="+mj-lt"/>
-              <a:buAutoNum type="arabicPeriod"/>
-            </a:pPr>
-            <a:endParaRPr lang="de-DE" sz="2400" dirty="0" smtClean="0"/>
-          </a:p>
-          <a:p>
-            <a:pPr marL="514350" indent="-514350">
-              <a:buFont typeface="+mj-lt"/>
-              <a:buAutoNum type="arabicPeriod"/>
-            </a:pPr>
-            <a:r>
-              <a:rPr lang="de-DE" sz="2800" dirty="0" smtClean="0"/>
-              <a:t>Euer Feedback und Fazit (10 Min.)</a:t>
-            </a:r>
-          </a:p>
-          <a:p>
-            <a:endParaRPr lang="de-DE" sz="2800" dirty="0"/>
+              <a:t>Achtung! Das Verhalten ist hier etwas anders, siehe Tests</a:t>
+            </a:r>
+            <a:endParaRPr lang="de-DE" sz="2000" dirty="0">
+              <a:solidFill>
+                <a:schemeClr val="tx2"/>
+              </a:solidFill>
+            </a:endParaRPr>
           </a:p>
         </p:txBody>
       </p:sp>
     </p:spTree>
     <p:extLst>
       <p:ext uri="{BB962C8B-B14F-4D97-AF65-F5344CB8AC3E}">
-        <p14:creationId xmlns:p14="http://schemas.microsoft.com/office/powerpoint/2010/main" val="4087090245"/>
+        <p14:creationId xmlns:p14="http://schemas.microsoft.com/office/powerpoint/2010/main" val="144594726"/>
       </p:ext>
     </p:extLst>
   </p:cSld>
@@ -5265,6 +5418,243 @@
           <a:p>
             <a:r>
               <a:rPr lang="de-DE" dirty="0" smtClean="0"/>
+              <a:t>Zeitplan</a:t>
+            </a:r>
+            <a:endParaRPr lang="de-DE" dirty="0"/>
+          </a:p>
+        </p:txBody>
+      </p:sp>
+      <p:sp>
+        <p:nvSpPr>
+          <p:cNvPr id="3" name="Inhaltsplatzhalter 2"/>
+          <p:cNvSpPr>
+            <a:spLocks noGrp="1"/>
+          </p:cNvSpPr>
+          <p:nvPr>
+            <p:ph idx="1"/>
+          </p:nvPr>
+        </p:nvSpPr>
+        <p:spPr/>
+        <p:txBody>
+          <a:bodyPr>
+            <a:normAutofit fontScale="92500"/>
+          </a:bodyPr>
+          <a:lstStyle/>
+          <a:p>
+            <a:pPr marL="514350" indent="-514350">
+              <a:buFont typeface="+mj-lt"/>
+              <a:buAutoNum type="arabicPeriod"/>
+            </a:pPr>
+            <a:r>
+              <a:rPr lang="de-DE" sz="2800" dirty="0" smtClean="0">
+                <a:solidFill>
+                  <a:schemeClr val="bg1">
+                    <a:lumMod val="65000"/>
+                  </a:schemeClr>
+                </a:solidFill>
+              </a:rPr>
+              <a:t>Vorstellung des Observer-Musters (ca. 15 Min.)</a:t>
+            </a:r>
+          </a:p>
+          <a:p>
+            <a:pPr marL="914400" lvl="1" indent="-514350">
+              <a:buFont typeface="+mj-lt"/>
+              <a:buAutoNum type="arabicPeriod"/>
+            </a:pPr>
+            <a:endParaRPr lang="de-DE" sz="2400" dirty="0" smtClean="0"/>
+          </a:p>
+          <a:p>
+            <a:pPr marL="514350" indent="-514350">
+              <a:buFont typeface="+mj-lt"/>
+              <a:buAutoNum type="arabicPeriod"/>
+            </a:pPr>
+            <a:r>
+              <a:rPr lang="de-DE" sz="2800" dirty="0" smtClean="0">
+                <a:solidFill>
+                  <a:schemeClr val="bg1">
+                    <a:lumMod val="65000"/>
+                  </a:schemeClr>
+                </a:solidFill>
+              </a:rPr>
+              <a:t>Muster selbst implementieren</a:t>
+            </a:r>
+          </a:p>
+          <a:p>
+            <a:pPr marL="914400" lvl="1" indent="-514350">
+              <a:buFont typeface="+mj-lt"/>
+              <a:buAutoNum type="alphaLcParenR"/>
+            </a:pPr>
+            <a:r>
+              <a:rPr lang="de-DE" sz="2400" dirty="0" smtClean="0">
+                <a:solidFill>
+                  <a:schemeClr val="bg1">
+                    <a:lumMod val="65000"/>
+                  </a:schemeClr>
+                </a:solidFill>
+              </a:rPr>
+              <a:t>Anwendungsproblem kennenlernen (ca. 5 Min.)</a:t>
+            </a:r>
+          </a:p>
+          <a:p>
+            <a:pPr marL="914400" lvl="1" indent="-514350">
+              <a:buFont typeface="+mj-lt"/>
+              <a:buAutoNum type="alphaLcParenR"/>
+            </a:pPr>
+            <a:r>
+              <a:rPr lang="de-DE" sz="2400" dirty="0" smtClean="0">
+                <a:solidFill>
+                  <a:schemeClr val="bg1">
+                    <a:lumMod val="65000"/>
+                  </a:schemeClr>
+                </a:solidFill>
+              </a:rPr>
+              <a:t>paarweise/einzeln Muster implementieren (ca. 20 Min.)</a:t>
+            </a:r>
+          </a:p>
+          <a:p>
+            <a:pPr marL="914400" lvl="1" indent="-514350">
+              <a:buFont typeface="+mj-lt"/>
+              <a:buAutoNum type="alphaLcParenR"/>
+            </a:pPr>
+            <a:endParaRPr lang="de-DE" sz="2400" dirty="0" smtClean="0"/>
+          </a:p>
+          <a:p>
+            <a:pPr marL="514350" indent="-514350">
+              <a:buFont typeface="+mj-lt"/>
+              <a:buAutoNum type="arabicPeriod"/>
+            </a:pPr>
+            <a:r>
+              <a:rPr lang="de-DE" sz="2800" dirty="0" smtClean="0">
+                <a:solidFill>
+                  <a:schemeClr val="bg1">
+                    <a:lumMod val="65000"/>
+                  </a:schemeClr>
+                </a:solidFill>
+              </a:rPr>
+              <a:t>Diskussion / Vergleich einiger Lösungen (ca. 10 Min.)</a:t>
+            </a:r>
+          </a:p>
+          <a:p>
+            <a:pPr marL="914400" lvl="1" indent="-514350">
+              <a:buFont typeface="+mj-lt"/>
+              <a:buAutoNum type="arabicPeriod"/>
+            </a:pPr>
+            <a:endParaRPr lang="de-DE" sz="2400" dirty="0" smtClean="0"/>
+          </a:p>
+          <a:p>
+            <a:pPr marL="514350" indent="-514350">
+              <a:buFont typeface="+mj-lt"/>
+              <a:buAutoNum type="arabicPeriod"/>
+            </a:pPr>
+            <a:r>
+              <a:rPr lang="de-DE" sz="2800" dirty="0">
+                <a:solidFill>
+                  <a:schemeClr val="bg1">
+                    <a:lumMod val="65000"/>
+                  </a:schemeClr>
+                </a:solidFill>
+              </a:rPr>
+              <a:t>Alternative Implementierung mit EMF (ca. </a:t>
+            </a:r>
+            <a:r>
+              <a:rPr lang="de-DE" sz="2800" dirty="0" smtClean="0">
+                <a:solidFill>
+                  <a:schemeClr val="bg1">
+                    <a:lumMod val="65000"/>
+                  </a:schemeClr>
+                </a:solidFill>
+              </a:rPr>
+              <a:t>20 </a:t>
+            </a:r>
+            <a:r>
+              <a:rPr lang="de-DE" sz="2800" dirty="0">
+                <a:solidFill>
+                  <a:schemeClr val="bg1">
+                    <a:lumMod val="65000"/>
+                  </a:schemeClr>
+                </a:solidFill>
+              </a:rPr>
+              <a:t>Min)</a:t>
+            </a:r>
+          </a:p>
+          <a:p>
+            <a:pPr marL="914400" lvl="1" indent="-514350">
+              <a:buFont typeface="+mj-lt"/>
+              <a:buAutoNum type="arabicPeriod"/>
+            </a:pPr>
+            <a:endParaRPr lang="de-DE" sz="2400" dirty="0" smtClean="0"/>
+          </a:p>
+          <a:p>
+            <a:pPr marL="514350" indent="-514350">
+              <a:buFont typeface="+mj-lt"/>
+              <a:buAutoNum type="arabicPeriod"/>
+            </a:pPr>
+            <a:r>
+              <a:rPr lang="de-DE" sz="2800" dirty="0" smtClean="0"/>
+              <a:t>Euer Feedback und Fazit (10 Min.)</a:t>
+            </a:r>
+          </a:p>
+          <a:p>
+            <a:endParaRPr lang="de-DE" sz="2800" dirty="0"/>
+          </a:p>
+        </p:txBody>
+      </p:sp>
+    </p:spTree>
+    <p:extLst>
+      <p:ext uri="{BB962C8B-B14F-4D97-AF65-F5344CB8AC3E}">
+        <p14:creationId xmlns:p14="http://schemas.microsoft.com/office/powerpoint/2010/main" val="4087090245"/>
+      </p:ext>
+    </p:extLst>
+  </p:cSld>
+  <p:clrMapOvr>
+    <a:masterClrMapping/>
+  </p:clrMapOvr>
+  <p:timing>
+    <p:tnLst>
+      <p:par>
+        <p:cTn id="1" dur="indefinite" restart="never" nodeType="tmRoot"/>
+      </p:par>
+    </p:tnLst>
+  </p:timing>
+</p:sld>
+</file>
+
+<file path=ppt/slides/slide18.xml><?xml version="1.0" encoding="utf-8"?>
+<p:sld xmlns:a="http://schemas.openxmlformats.org/drawingml/2006/main" xmlns:r="http://schemas.openxmlformats.org/officeDocument/2006/relationships" xmlns:p="http://schemas.openxmlformats.org/presentationml/2006/main">
+  <p:cSld>
+    <p:spTree>
+      <p:nvGrpSpPr>
+        <p:cNvPr id="1" name=""/>
+        <p:cNvGrpSpPr/>
+        <p:nvPr/>
+      </p:nvGrpSpPr>
+      <p:grpSpPr>
+        <a:xfrm>
+          <a:off x="0" y="0"/>
+          <a:ext cx="0" cy="0"/>
+          <a:chOff x="0" y="0"/>
+          <a:chExt cx="0" cy="0"/>
+        </a:xfrm>
+      </p:grpSpPr>
+      <p:sp>
+        <p:nvSpPr>
+          <p:cNvPr id="2" name="Titel 1"/>
+          <p:cNvSpPr>
+            <a:spLocks noGrp="1"/>
+          </p:cNvSpPr>
+          <p:nvPr>
+            <p:ph type="title"/>
+          </p:nvPr>
+        </p:nvSpPr>
+        <p:spPr/>
+        <p:txBody>
+          <a:bodyPr>
+            <a:normAutofit fontScale="90000"/>
+          </a:bodyPr>
+          <a:lstStyle/>
+          <a:p>
+            <a:r>
+              <a:rPr lang="de-DE" dirty="0" smtClean="0"/>
               <a:t>Euer Feedback</a:t>
             </a:r>
             <a:endParaRPr lang="de-DE" dirty="0"/>
@@ -5302,11 +5692,7 @@
             </a:r>
             <a:r>
               <a:rPr lang="en-US" dirty="0" smtClean="0"/>
-              <a:t> </a:t>
-            </a:r>
-            <a:r>
-              <a:rPr lang="en-US" dirty="0" smtClean="0"/>
-              <a:t>das Muster </a:t>
+              <a:t> das Muster </a:t>
             </a:r>
             <a:r>
               <a:rPr lang="en-US" dirty="0" err="1" smtClean="0"/>
@@ -5351,7 +5737,6 @@
               <a:rPr lang="en-US" dirty="0" smtClean="0"/>
               <a:t>?</a:t>
             </a:r>
-            <a:endParaRPr lang="en-US" dirty="0" smtClean="0"/>
           </a:p>
           <a:p>
             <a:r>
@@ -5899,11 +6284,7 @@
             </a:pPr>
             <a:r>
               <a:rPr lang="de-DE" sz="2000" b="1" dirty="0" smtClean="0"/>
-              <a:t>Anwendungsbeispiel</a:t>
-            </a:r>
-            <a:r>
-              <a:rPr lang="de-DE" sz="2000" b="1" dirty="0" smtClean="0"/>
-              <a:t>:</a:t>
+              <a:t>Anwendungsbeispiel:</a:t>
             </a:r>
           </a:p>
           <a:p>
@@ -6379,11 +6760,7 @@
             </a:pPr>
             <a:r>
               <a:rPr lang="de-DE" sz="2000" b="1" dirty="0" smtClean="0"/>
-              <a:t>Anwendungsbeispiel</a:t>
-            </a:r>
-            <a:r>
-              <a:rPr lang="de-DE" sz="2000" b="1" dirty="0" smtClean="0"/>
-              <a:t>:</a:t>
+              <a:t>Anwendungsbeispiel:</a:t>
             </a:r>
           </a:p>
           <a:p>
@@ -6613,11 +6990,7 @@
             </a:pPr>
             <a:r>
               <a:rPr lang="de-DE" sz="2000" b="1" dirty="0" smtClean="0"/>
-              <a:t>Anwendungsbeispiel</a:t>
-            </a:r>
-            <a:r>
-              <a:rPr lang="de-DE" sz="2000" b="1" dirty="0" smtClean="0"/>
-              <a:t>:</a:t>
+              <a:t>Anwendungsbeispiel:</a:t>
             </a:r>
           </a:p>
           <a:p>
@@ -6847,11 +7220,7 @@
             </a:pPr>
             <a:r>
               <a:rPr lang="de-DE" sz="2000" b="1" dirty="0" smtClean="0"/>
-              <a:t>Anwendungsbeispiel</a:t>
-            </a:r>
-            <a:r>
-              <a:rPr lang="de-DE" sz="2000" b="1" dirty="0" smtClean="0"/>
-              <a:t>:</a:t>
+              <a:t>Anwendungsbeispiel:</a:t>
             </a:r>
           </a:p>
           <a:p>
@@ -6908,11 +7277,7 @@
           <a:p>
             <a:r>
               <a:rPr lang="de-DE" sz="1800" dirty="0" smtClean="0"/>
-              <a:t>Beobachtete Daten von Beobachtern entkoppeln. D.h. </a:t>
-            </a:r>
-            <a:r>
-              <a:rPr lang="de-DE" sz="1800" dirty="0" smtClean="0"/>
-              <a:t>Abhängigkeiten nur von Beobachtern zu den Beobachteten </a:t>
+              <a:t>Beobachtete Daten von Beobachtern entkoppeln. D.h. Abhängigkeiten nur von Beobachtern zu den Beobachteten </a:t>
             </a:r>
             <a:r>
               <a:rPr lang="de-DE" sz="1800" dirty="0"/>
@@ -7248,11 +7613,7 @@
           <a:p>
             <a:r>
               <a:rPr lang="de-DE" sz="1800" dirty="0" smtClean="0"/>
-              <a:t>beliebig viele Observer können sich jederzeit </a:t>
-            </a:r>
-            <a:r>
-              <a:rPr lang="de-DE" sz="1800" dirty="0" smtClean="0"/>
-              <a:t>registrieren/de-registrieren</a:t>
+              <a:t>beliebig viele Observer können sich jederzeit registrieren/de-registrieren</a:t>
             </a:r>
           </a:p>
           <a:p>
@@ -7268,7 +7629,6 @@
               <a:rPr lang="de-DE" sz="1800" dirty="0" smtClean="0"/>
               <a:t>-Oberklasse</a:t>
             </a:r>
-            <a:endParaRPr lang="de-DE" sz="1800" dirty="0" smtClean="0"/>
           </a:p>
         </p:txBody>
       </p:sp>

</xml_diff>

<commit_message>
Hopefully last slide changes
</commit_message>
<xml_diff>
--- a/Observer/Coding-Dojo-2015-05-06.pptx
+++ b/Observer/Coding-Dojo-2015-05-06.pptx
@@ -3099,10 +3099,15 @@
             <p:ph idx="1"/>
           </p:nvPr>
         </p:nvSpPr>
-        <p:spPr/>
+        <p:spPr>
+          <a:xfrm>
+            <a:off x="457200" y="1052736"/>
+            <a:ext cx="8229600" cy="5256584"/>
+          </a:xfrm>
+        </p:spPr>
         <p:txBody>
           <a:bodyPr>
-            <a:normAutofit lnSpcReduction="10000"/>
+            <a:normAutofit fontScale="92500" lnSpcReduction="20000"/>
           </a:bodyPr>
           <a:lstStyle/>
           <a:p>
@@ -3115,7 +3120,11 @@
             <a:pPr lvl="1"/>
             <a:r>
               <a:rPr lang="de-DE" sz="2000" dirty="0" smtClean="0"/>
-              <a:t>Java JDK 1.7</a:t>
+              <a:t>Java JDK </a:t>
+            </a:r>
+            <a:r>
+              <a:rPr lang="de-DE" sz="2000" dirty="0" smtClean="0"/>
+              <a:t>1.7</a:t>
             </a:r>
           </a:p>
           <a:p>
@@ -3126,11 +3135,46 @@
             </a:r>
             <a:r>
               <a:rPr lang="de-DE" sz="2000" dirty="0" smtClean="0"/>
-              <a:t> (z.B. </a:t>
+              <a:t> </a:t>
             </a:r>
             <a:r>
               <a:rPr lang="de-DE" sz="2000" dirty="0" smtClean="0"/>
-              <a:t>Kepler, 4.3)</a:t>
+              <a:t>(z.B. Kepler, 4.3</a:t>
+            </a:r>
+            <a:r>
+              <a:rPr lang="de-DE" sz="2000" dirty="0" smtClean="0"/>
+              <a:t>)</a:t>
+            </a:r>
+          </a:p>
+          <a:p>
+            <a:pPr lvl="1"/>
+            <a:r>
+              <a:rPr lang="de-DE" sz="2000" dirty="0" err="1" smtClean="0"/>
+              <a:t>Git</a:t>
+            </a:r>
+            <a:r>
+              <a:rPr lang="de-DE" sz="2000" dirty="0" smtClean="0"/>
+              <a:t>-Client (z.B. </a:t>
+            </a:r>
+            <a:r>
+              <a:rPr lang="de-DE" sz="2000" dirty="0" err="1" smtClean="0"/>
+              <a:t>SourceTree</a:t>
+            </a:r>
+            <a:r>
+              <a:rPr lang="de-DE" sz="2000" dirty="0" smtClean="0"/>
+              <a:t> oder </a:t>
+            </a:r>
+            <a:r>
+              <a:rPr lang="de-DE" sz="2000" dirty="0" err="1" smtClean="0"/>
+              <a:t>TortoiseGit</a:t>
+            </a:r>
+            <a:r>
+              <a:rPr lang="de-DE" sz="2000" dirty="0" smtClean="0"/>
+              <a:t>) oder </a:t>
+            </a:r>
+            <a:r>
+              <a:rPr lang="de-DE" sz="2000" dirty="0" err="1" smtClean="0"/>
+              <a:t>Eclipse-Git-Plug-in</a:t>
             </a:r>
             <a:endParaRPr lang="de-DE" sz="2000" dirty="0" smtClean="0"/>
           </a:p>
@@ -3144,37 +3188,397 @@
                   </a:schemeClr>
                 </a:solidFill>
               </a:rPr>
-              <a:t>Optional: </a:t>
-            </a:r>
-            <a:r>
-              <a:rPr lang="de-DE" sz="2000" dirty="0" smtClean="0">
+              <a:t>Optional: folgende </a:t>
+            </a:r>
+            <a:r>
+              <a:rPr lang="de-DE" sz="2000" dirty="0" err="1" smtClean="0">
                 <a:solidFill>
                   <a:schemeClr val="bg1">
                     <a:lumMod val="50000"/>
                   </a:schemeClr>
                 </a:solidFill>
               </a:rPr>
-              <a:t>folgende </a:t>
-            </a:r>
-            <a:r>
-              <a:rPr lang="de-DE" sz="2000" dirty="0" err="1" smtClean="0">
+              <a:t>Eclipse-Plug-ins</a:t>
+            </a:r>
+            <a:r>
+              <a:rPr lang="de-DE" sz="2000" dirty="0" smtClean="0">
                 <a:solidFill>
                   <a:schemeClr val="bg1">
                     <a:lumMod val="50000"/>
                   </a:schemeClr>
                 </a:solidFill>
               </a:rPr>
-              <a:t>Eclipse-Plug-ins</a:t>
-            </a:r>
-            <a:r>
-              <a:rPr lang="de-DE" sz="2000" dirty="0" smtClean="0">
+              <a:t> installieren:</a:t>
+            </a:r>
+          </a:p>
+          <a:p>
+            <a:pPr lvl="2"/>
+            <a:r>
+              <a:rPr lang="de-DE" sz="1800" dirty="0" err="1" smtClean="0">
                 <a:solidFill>
                   <a:schemeClr val="bg1">
                     <a:lumMod val="50000"/>
                   </a:schemeClr>
                 </a:solidFill>
               </a:rPr>
-              <a:t> installieren:</a:t>
+              <a:t>InfiniTest</a:t>
+            </a:r>
+            <a:r>
+              <a:rPr lang="de-DE" sz="1800" dirty="0" smtClean="0">
+                <a:solidFill>
+                  <a:schemeClr val="bg1">
+                    <a:lumMod val="50000"/>
+                  </a:schemeClr>
+                </a:solidFill>
+              </a:rPr>
+              <a:t> (</a:t>
+            </a:r>
+            <a:r>
+              <a:rPr lang="de-DE" sz="1800" dirty="0" err="1" smtClean="0">
+                <a:solidFill>
+                  <a:schemeClr val="bg1">
+                    <a:lumMod val="50000"/>
+                  </a:schemeClr>
+                </a:solidFill>
+              </a:rPr>
+              <a:t>JUnit</a:t>
+            </a:r>
+            <a:r>
+              <a:rPr lang="de-DE" sz="1800" dirty="0" smtClean="0">
+                <a:solidFill>
+                  <a:schemeClr val="bg1">
+                    <a:lumMod val="50000"/>
+                  </a:schemeClr>
+                </a:solidFill>
+              </a:rPr>
+              <a:t>-Tests ausführen </a:t>
+            </a:r>
+            <a:r>
+              <a:rPr lang="de-DE" sz="1800" dirty="0">
+                <a:solidFill>
+                  <a:schemeClr val="bg1">
+                    <a:lumMod val="50000"/>
+                  </a:schemeClr>
+                </a:solidFill>
+              </a:rPr>
+              <a:t>beim Speichern) </a:t>
+            </a:r>
+            <a:r>
+              <a:rPr lang="de-DE" sz="1800" dirty="0">
+                <a:solidFill>
+                  <a:schemeClr val="bg1">
+                    <a:lumMod val="50000"/>
+                  </a:schemeClr>
+                </a:solidFill>
+                <a:hlinkClick r:id="rId2"/>
+              </a:rPr>
+              <a:t>http://</a:t>
+            </a:r>
+            <a:r>
+              <a:rPr lang="de-DE" sz="1800" dirty="0" smtClean="0">
+                <a:solidFill>
+                  <a:schemeClr val="bg1">
+                    <a:lumMod val="50000"/>
+                  </a:schemeClr>
+                </a:solidFill>
+                <a:hlinkClick r:id="rId2"/>
+              </a:rPr>
+              <a:t>infinitest.github.io</a:t>
+            </a:r>
+            <a:endParaRPr lang="de-DE" sz="1800" dirty="0" smtClean="0">
+              <a:solidFill>
+                <a:schemeClr val="bg1">
+                  <a:lumMod val="50000"/>
+                </a:schemeClr>
+              </a:solidFill>
+            </a:endParaRPr>
+          </a:p>
+          <a:p>
+            <a:pPr lvl="2"/>
+            <a:r>
+              <a:rPr lang="de-DE" sz="1800" dirty="0" err="1" smtClean="0">
+                <a:solidFill>
+                  <a:schemeClr val="bg1">
+                    <a:lumMod val="50000"/>
+                  </a:schemeClr>
+                </a:solidFill>
+              </a:rPr>
+              <a:t>EclEMMA</a:t>
+            </a:r>
+            <a:r>
+              <a:rPr lang="de-DE" sz="1800" dirty="0" smtClean="0">
+                <a:solidFill>
+                  <a:schemeClr val="bg1">
+                    <a:lumMod val="50000"/>
+                  </a:schemeClr>
+                </a:solidFill>
+              </a:rPr>
+              <a:t> (Code </a:t>
+            </a:r>
+            <a:r>
+              <a:rPr lang="de-DE" sz="1800" dirty="0" err="1" smtClean="0">
+                <a:solidFill>
+                  <a:schemeClr val="bg1">
+                    <a:lumMod val="50000"/>
+                  </a:schemeClr>
+                </a:solidFill>
+              </a:rPr>
+              <a:t>Coverage</a:t>
+            </a:r>
+            <a:r>
+              <a:rPr lang="de-DE" sz="1800" dirty="0" smtClean="0">
+                <a:solidFill>
+                  <a:schemeClr val="bg1">
+                    <a:lumMod val="50000"/>
+                  </a:schemeClr>
+                </a:solidFill>
+              </a:rPr>
+              <a:t>): </a:t>
+            </a:r>
+            <a:r>
+              <a:rPr lang="de-DE" sz="1800" dirty="0">
+                <a:solidFill>
+                  <a:schemeClr val="bg1">
+                    <a:lumMod val="50000"/>
+                  </a:schemeClr>
+                </a:solidFill>
+                <a:hlinkClick r:id="rId3"/>
+              </a:rPr>
+              <a:t>http://update.eclemma.org</a:t>
+            </a:r>
+            <a:r>
+              <a:rPr lang="de-DE" sz="1800" dirty="0" smtClean="0">
+                <a:solidFill>
+                  <a:schemeClr val="bg1">
+                    <a:lumMod val="50000"/>
+                  </a:schemeClr>
+                </a:solidFill>
+                <a:hlinkClick r:id="rId3"/>
+              </a:rPr>
+              <a:t>/</a:t>
+            </a:r>
+            <a:endParaRPr lang="de-DE" sz="1800" dirty="0" smtClean="0">
+              <a:solidFill>
+                <a:schemeClr val="bg1">
+                  <a:lumMod val="50000"/>
+                </a:schemeClr>
+              </a:solidFill>
+            </a:endParaRPr>
+          </a:p>
+          <a:p>
+            <a:pPr lvl="2"/>
+            <a:r>
+              <a:rPr lang="de-DE" sz="1800" dirty="0" err="1" smtClean="0">
+                <a:solidFill>
+                  <a:schemeClr val="bg1">
+                    <a:lumMod val="50000"/>
+                  </a:schemeClr>
+                </a:solidFill>
+              </a:rPr>
+              <a:t>ObjectAid</a:t>
+            </a:r>
+            <a:r>
+              <a:rPr lang="de-DE" sz="1800" dirty="0" smtClean="0">
+                <a:solidFill>
+                  <a:schemeClr val="bg1">
+                    <a:lumMod val="50000"/>
+                  </a:schemeClr>
+                </a:solidFill>
+              </a:rPr>
+              <a:t> (Klassendiagramme aus </a:t>
+            </a:r>
+            <a:r>
+              <a:rPr lang="de-DE" sz="1800" dirty="0">
+                <a:solidFill>
+                  <a:schemeClr val="bg1">
+                    <a:lumMod val="50000"/>
+                  </a:schemeClr>
+                </a:solidFill>
+              </a:rPr>
+              <a:t>Code generieren) </a:t>
+            </a:r>
+            <a:r>
+              <a:rPr lang="de-DE" sz="1800" dirty="0">
+                <a:solidFill>
+                  <a:schemeClr val="bg1">
+                    <a:lumMod val="50000"/>
+                  </a:schemeClr>
+                </a:solidFill>
+                <a:hlinkClick r:id="rId4"/>
+              </a:rPr>
+              <a:t>http://</a:t>
+            </a:r>
+            <a:r>
+              <a:rPr lang="de-DE" sz="1800" dirty="0" smtClean="0">
+                <a:solidFill>
+                  <a:schemeClr val="bg1">
+                    <a:lumMod val="50000"/>
+                  </a:schemeClr>
+                </a:solidFill>
+                <a:hlinkClick r:id="rId4"/>
+              </a:rPr>
+              <a:t>www.objectaid.net/update</a:t>
+            </a:r>
+            <a:endParaRPr lang="de-DE" sz="1800" dirty="0" smtClean="0">
+              <a:solidFill>
+                <a:schemeClr val="bg1">
+                  <a:lumMod val="50000"/>
+                </a:schemeClr>
+              </a:solidFill>
+            </a:endParaRPr>
+          </a:p>
+          <a:p>
+            <a:r>
+              <a:rPr lang="de-DE" sz="2400" dirty="0" err="1" smtClean="0"/>
+              <a:t>Eclipse</a:t>
+            </a:r>
+            <a:r>
+              <a:rPr lang="de-DE" sz="2400" dirty="0" smtClean="0"/>
+              <a:t>-Projekt(e) auschecken und im </a:t>
+            </a:r>
+            <a:r>
+              <a:rPr lang="de-DE" sz="2400" dirty="0" err="1" smtClean="0"/>
+              <a:t>Eclipse</a:t>
+            </a:r>
+            <a:r>
+              <a:rPr lang="de-DE" sz="2400" dirty="0" smtClean="0"/>
+              <a:t>-Workspace </a:t>
+            </a:r>
+            <a:r>
+              <a:rPr lang="de-DE" sz="2400" dirty="0" smtClean="0"/>
+              <a:t>importieren (nun bei </a:t>
+            </a:r>
+            <a:r>
+              <a:rPr lang="de-DE" sz="2400" dirty="0" err="1" smtClean="0"/>
+              <a:t>GitLab</a:t>
+            </a:r>
+            <a:r>
+              <a:rPr lang="de-DE" sz="2400" dirty="0" smtClean="0"/>
+              <a:t> statt bei </a:t>
+            </a:r>
+            <a:r>
+              <a:rPr lang="de-DE" sz="2400" dirty="0" err="1" smtClean="0"/>
+              <a:t>GitHub</a:t>
+            </a:r>
+            <a:r>
+              <a:rPr lang="de-DE" sz="2400" dirty="0" smtClean="0"/>
+              <a:t>):</a:t>
+            </a:r>
+            <a:endParaRPr lang="de-DE" sz="2400" dirty="0" smtClean="0"/>
+          </a:p>
+          <a:p>
+            <a:pPr lvl="1"/>
+            <a:r>
+              <a:rPr lang="de-DE" sz="2000" dirty="0" smtClean="0"/>
+              <a:t>Repository: </a:t>
+            </a:r>
+            <a:r>
+              <a:rPr lang="de-DE" sz="2000" dirty="0">
+                <a:hlinkClick r:id="rId5"/>
+              </a:rPr>
+              <a:t>https://gitlab.com/itbastian/CodingDojoDPA.git</a:t>
+            </a:r>
+            <a:endParaRPr lang="de-DE" sz="2000" dirty="0" smtClean="0"/>
+          </a:p>
+          <a:p>
+            <a:pPr lvl="1"/>
+            <a:r>
+              <a:rPr lang="de-DE" sz="2000" dirty="0" smtClean="0"/>
+              <a:t>Pfad: …/</a:t>
+            </a:r>
+            <a:r>
+              <a:rPr lang="de-DE" sz="2000" dirty="0" err="1" smtClean="0"/>
+              <a:t>CodingDojoDPA</a:t>
+            </a:r>
+            <a:r>
+              <a:rPr lang="de-DE" sz="2000" dirty="0" smtClean="0"/>
+              <a:t>/Observer/&lt;Projekt&gt;</a:t>
+            </a:r>
+          </a:p>
+          <a:p>
+            <a:pPr lvl="1"/>
+            <a:r>
+              <a:rPr lang="de-DE" sz="2000" dirty="0" smtClean="0"/>
+              <a:t>Projekte:</a:t>
+            </a:r>
+          </a:p>
+          <a:p>
+            <a:pPr lvl="2"/>
+            <a:r>
+              <a:rPr lang="de-DE" sz="1600" dirty="0" err="1" smtClean="0"/>
+              <a:t>ObserverExample</a:t>
+            </a:r>
+            <a:endParaRPr lang="de-DE" sz="1600" dirty="0" smtClean="0"/>
+          </a:p>
+          <a:p>
+            <a:pPr lvl="2"/>
+            <a:r>
+              <a:rPr lang="de-DE" sz="1600" dirty="0" err="1" smtClean="0"/>
+              <a:t>ObserverEMFExample</a:t>
+            </a:r>
+            <a:endParaRPr lang="de-DE" sz="1600" dirty="0" smtClean="0"/>
+          </a:p>
+          <a:p>
+            <a:pPr lvl="1"/>
+            <a:r>
+              <a:rPr lang="de-DE" sz="2000" dirty="0" smtClean="0">
+                <a:solidFill>
+                  <a:schemeClr val="bg1">
+                    <a:lumMod val="50000"/>
+                  </a:schemeClr>
+                </a:solidFill>
+              </a:rPr>
+              <a:t>Optional: Konto bei </a:t>
+            </a:r>
+            <a:r>
+              <a:rPr lang="de-DE" sz="2000" dirty="0" err="1" smtClean="0">
+                <a:solidFill>
+                  <a:schemeClr val="bg1">
+                    <a:lumMod val="50000"/>
+                  </a:schemeClr>
+                </a:solidFill>
+              </a:rPr>
+              <a:t>GitLab</a:t>
+            </a:r>
+            <a:r>
+              <a:rPr lang="de-DE" sz="2000" dirty="0" smtClean="0">
+                <a:solidFill>
+                  <a:schemeClr val="bg1">
+                    <a:lumMod val="50000"/>
+                  </a:schemeClr>
+                </a:solidFill>
+              </a:rPr>
+              <a:t> </a:t>
+            </a:r>
+            <a:r>
+              <a:rPr lang="de-DE" sz="2000" dirty="0" smtClean="0">
+                <a:solidFill>
+                  <a:schemeClr val="bg1">
+                    <a:lumMod val="50000"/>
+                  </a:schemeClr>
+                </a:solidFill>
+              </a:rPr>
+              <a:t>einrichten </a:t>
+            </a:r>
+            <a:r>
+              <a:rPr lang="de-DE" sz="2000" dirty="0" smtClean="0">
+                <a:solidFill>
+                  <a:schemeClr val="bg1">
+                    <a:lumMod val="50000"/>
+                  </a:schemeClr>
+                </a:solidFill>
+              </a:rPr>
+              <a:t>zwecks Push zu </a:t>
+            </a:r>
+            <a:r>
+              <a:rPr lang="de-DE" sz="2000" dirty="0" err="1" smtClean="0">
+                <a:solidFill>
+                  <a:schemeClr val="bg1">
+                    <a:lumMod val="50000"/>
+                  </a:schemeClr>
+                </a:solidFill>
+              </a:rPr>
+              <a:t>GitLab</a:t>
             </a:r>
             <a:endParaRPr lang="de-DE" sz="2000" dirty="0" smtClean="0">
               <a:solidFill>
@@ -3185,312 +3589,6 @@
             </a:endParaRPr>
           </a:p>
           <a:p>
-            <a:pPr lvl="2"/>
-            <a:r>
-              <a:rPr lang="de-DE" sz="1800" dirty="0" err="1" smtClean="0">
-                <a:solidFill>
-                  <a:schemeClr val="bg1">
-                    <a:lumMod val="50000"/>
-                  </a:schemeClr>
-                </a:solidFill>
-              </a:rPr>
-              <a:t>InfiniTest</a:t>
-            </a:r>
-            <a:r>
-              <a:rPr lang="de-DE" sz="1800" dirty="0" smtClean="0">
-                <a:solidFill>
-                  <a:schemeClr val="bg1">
-                    <a:lumMod val="50000"/>
-                  </a:schemeClr>
-                </a:solidFill>
-              </a:rPr>
-              <a:t> (</a:t>
-            </a:r>
-            <a:r>
-              <a:rPr lang="de-DE" sz="1800" dirty="0" err="1" smtClean="0">
-                <a:solidFill>
-                  <a:schemeClr val="bg1">
-                    <a:lumMod val="50000"/>
-                  </a:schemeClr>
-                </a:solidFill>
-              </a:rPr>
-              <a:t>JUnit</a:t>
-            </a:r>
-            <a:r>
-              <a:rPr lang="de-DE" sz="1800" dirty="0" smtClean="0">
-                <a:solidFill>
-                  <a:schemeClr val="bg1">
-                    <a:lumMod val="50000"/>
-                  </a:schemeClr>
-                </a:solidFill>
-              </a:rPr>
-              <a:t>-Tests ausführen </a:t>
-            </a:r>
-            <a:r>
-              <a:rPr lang="de-DE" sz="1800" dirty="0">
-                <a:solidFill>
-                  <a:schemeClr val="bg1">
-                    <a:lumMod val="50000"/>
-                  </a:schemeClr>
-                </a:solidFill>
-              </a:rPr>
-              <a:t>beim Speichern) </a:t>
-            </a:r>
-            <a:r>
-              <a:rPr lang="de-DE" sz="1800" dirty="0">
-                <a:solidFill>
-                  <a:schemeClr val="bg1">
-                    <a:lumMod val="50000"/>
-                  </a:schemeClr>
-                </a:solidFill>
-                <a:hlinkClick r:id="rId2"/>
-              </a:rPr>
-              <a:t>http://</a:t>
-            </a:r>
-            <a:r>
-              <a:rPr lang="de-DE" sz="1800" dirty="0" smtClean="0">
-                <a:solidFill>
-                  <a:schemeClr val="bg1">
-                    <a:lumMod val="50000"/>
-                  </a:schemeClr>
-                </a:solidFill>
-                <a:hlinkClick r:id="rId2"/>
-              </a:rPr>
-              <a:t>infinitest.github.io</a:t>
-            </a:r>
-            <a:endParaRPr lang="de-DE" sz="1800" dirty="0" smtClean="0">
-              <a:solidFill>
-                <a:schemeClr val="bg1">
-                  <a:lumMod val="50000"/>
-                </a:schemeClr>
-              </a:solidFill>
-            </a:endParaRPr>
-          </a:p>
-          <a:p>
-            <a:pPr lvl="2"/>
-            <a:r>
-              <a:rPr lang="de-DE" sz="1800" dirty="0" err="1" smtClean="0">
-                <a:solidFill>
-                  <a:schemeClr val="bg1">
-                    <a:lumMod val="50000"/>
-                  </a:schemeClr>
-                </a:solidFill>
-              </a:rPr>
-              <a:t>EclEMMA</a:t>
-            </a:r>
-            <a:r>
-              <a:rPr lang="de-DE" sz="1800" dirty="0" smtClean="0">
-                <a:solidFill>
-                  <a:schemeClr val="bg1">
-                    <a:lumMod val="50000"/>
-                  </a:schemeClr>
-                </a:solidFill>
-              </a:rPr>
-              <a:t> (Code </a:t>
-            </a:r>
-            <a:r>
-              <a:rPr lang="de-DE" sz="1800" dirty="0" err="1" smtClean="0">
-                <a:solidFill>
-                  <a:schemeClr val="bg1">
-                    <a:lumMod val="50000"/>
-                  </a:schemeClr>
-                </a:solidFill>
-              </a:rPr>
-              <a:t>Coverage</a:t>
-            </a:r>
-            <a:r>
-              <a:rPr lang="de-DE" sz="1800" dirty="0" smtClean="0">
-                <a:solidFill>
-                  <a:schemeClr val="bg1">
-                    <a:lumMod val="50000"/>
-                  </a:schemeClr>
-                </a:solidFill>
-              </a:rPr>
-              <a:t>): </a:t>
-            </a:r>
-            <a:r>
-              <a:rPr lang="de-DE" sz="1800" dirty="0">
-                <a:solidFill>
-                  <a:schemeClr val="bg1">
-                    <a:lumMod val="50000"/>
-                  </a:schemeClr>
-                </a:solidFill>
-                <a:hlinkClick r:id="rId3"/>
-              </a:rPr>
-              <a:t>http://update.eclemma.org</a:t>
-            </a:r>
-            <a:r>
-              <a:rPr lang="de-DE" sz="1800" dirty="0" smtClean="0">
-                <a:solidFill>
-                  <a:schemeClr val="bg1">
-                    <a:lumMod val="50000"/>
-                  </a:schemeClr>
-                </a:solidFill>
-                <a:hlinkClick r:id="rId3"/>
-              </a:rPr>
-              <a:t>/</a:t>
-            </a:r>
-            <a:endParaRPr lang="de-DE" sz="1800" dirty="0" smtClean="0">
-              <a:solidFill>
-                <a:schemeClr val="bg1">
-                  <a:lumMod val="50000"/>
-                </a:schemeClr>
-              </a:solidFill>
-            </a:endParaRPr>
-          </a:p>
-          <a:p>
-            <a:pPr lvl="2"/>
-            <a:r>
-              <a:rPr lang="de-DE" sz="1800" dirty="0" err="1" smtClean="0">
-                <a:solidFill>
-                  <a:schemeClr val="bg1">
-                    <a:lumMod val="50000"/>
-                  </a:schemeClr>
-                </a:solidFill>
-              </a:rPr>
-              <a:t>ObjectAid</a:t>
-            </a:r>
-            <a:r>
-              <a:rPr lang="de-DE" sz="1800" dirty="0" smtClean="0">
-                <a:solidFill>
-                  <a:schemeClr val="bg1">
-                    <a:lumMod val="50000"/>
-                  </a:schemeClr>
-                </a:solidFill>
-              </a:rPr>
-              <a:t> (Klassendiagramme aus </a:t>
-            </a:r>
-            <a:r>
-              <a:rPr lang="de-DE" sz="1800" dirty="0">
-                <a:solidFill>
-                  <a:schemeClr val="bg1">
-                    <a:lumMod val="50000"/>
-                  </a:schemeClr>
-                </a:solidFill>
-              </a:rPr>
-              <a:t>Code generieren) </a:t>
-            </a:r>
-            <a:r>
-              <a:rPr lang="de-DE" sz="1800" dirty="0">
-                <a:solidFill>
-                  <a:schemeClr val="bg1">
-                    <a:lumMod val="50000"/>
-                  </a:schemeClr>
-                </a:solidFill>
-                <a:hlinkClick r:id="rId4"/>
-              </a:rPr>
-              <a:t>http://</a:t>
-            </a:r>
-            <a:r>
-              <a:rPr lang="de-DE" sz="1800" dirty="0" smtClean="0">
-                <a:solidFill>
-                  <a:schemeClr val="bg1">
-                    <a:lumMod val="50000"/>
-                  </a:schemeClr>
-                </a:solidFill>
-                <a:hlinkClick r:id="rId4"/>
-              </a:rPr>
-              <a:t>www.objectaid.net/update</a:t>
-            </a:r>
-            <a:endParaRPr lang="de-DE" sz="1800" dirty="0" smtClean="0">
-              <a:solidFill>
-                <a:schemeClr val="bg1">
-                  <a:lumMod val="50000"/>
-                </a:schemeClr>
-              </a:solidFill>
-            </a:endParaRPr>
-          </a:p>
-          <a:p>
-            <a:r>
-              <a:rPr lang="de-DE" sz="2400" dirty="0" err="1" smtClean="0"/>
-              <a:t>Eclipse</a:t>
-            </a:r>
-            <a:r>
-              <a:rPr lang="de-DE" sz="2400" dirty="0" smtClean="0"/>
-              <a:t>-Projekt(e) auschecken und im </a:t>
-            </a:r>
-            <a:r>
-              <a:rPr lang="de-DE" sz="2400" dirty="0" err="1" smtClean="0"/>
-              <a:t>Eclipse</a:t>
-            </a:r>
-            <a:r>
-              <a:rPr lang="de-DE" sz="2400" dirty="0" smtClean="0"/>
-              <a:t>-Workspace importieren:</a:t>
-            </a:r>
-          </a:p>
-          <a:p>
-            <a:pPr lvl="1"/>
-            <a:r>
-              <a:rPr lang="de-DE" sz="2000" dirty="0" err="1" smtClean="0"/>
-              <a:t>ObserverExample</a:t>
-            </a:r>
-            <a:r>
-              <a:rPr lang="de-DE" sz="2000" dirty="0" smtClean="0"/>
-              <a:t> (</a:t>
-            </a:r>
-            <a:r>
-              <a:rPr lang="de-DE" sz="2000" dirty="0" err="1" smtClean="0"/>
-              <a:t>GitHub</a:t>
-            </a:r>
-            <a:r>
-              <a:rPr lang="de-DE" sz="2000" dirty="0"/>
-              <a:t>) </a:t>
-            </a:r>
-            <a:r>
-              <a:rPr lang="de-DE" sz="2000" dirty="0">
-                <a:hlinkClick r:id="rId5"/>
-              </a:rPr>
-              <a:t>https://</a:t>
-            </a:r>
-            <a:r>
-              <a:rPr lang="de-DE" sz="2000" dirty="0" smtClean="0">
-                <a:hlinkClick r:id="rId5"/>
-              </a:rPr>
-              <a:t>gitlab.com/itbastian/CodingDojoDPA.git</a:t>
-            </a:r>
-            <a:endParaRPr lang="de-DE" sz="2000" dirty="0" smtClean="0"/>
-          </a:p>
-          <a:p>
-            <a:pPr lvl="1"/>
-            <a:r>
-              <a:rPr lang="de-DE" sz="2000" dirty="0" smtClean="0">
-                <a:solidFill>
-                  <a:schemeClr val="bg1">
-                    <a:lumMod val="50000"/>
-                  </a:schemeClr>
-                </a:solidFill>
-              </a:rPr>
-              <a:t>Optional: Konto bei gitlab.com einrichten oder von </a:t>
-            </a:r>
-            <a:r>
-              <a:rPr lang="de-DE" sz="2000" dirty="0" err="1" smtClean="0">
-                <a:solidFill>
-                  <a:schemeClr val="bg1">
-                    <a:lumMod val="50000"/>
-                  </a:schemeClr>
-                </a:solidFill>
-              </a:rPr>
-              <a:t>GitHub</a:t>
-            </a:r>
-            <a:r>
-              <a:rPr lang="de-DE" sz="2000" dirty="0" smtClean="0">
-                <a:solidFill>
-                  <a:schemeClr val="bg1">
-                    <a:lumMod val="50000"/>
-                  </a:schemeClr>
-                </a:solidFill>
-              </a:rPr>
-              <a:t> mitnehmen</a:t>
-            </a:r>
-            <a:endParaRPr lang="de-DE" sz="2000" dirty="0" smtClean="0">
-              <a:solidFill>
-                <a:schemeClr val="bg1">
-                  <a:lumMod val="50000"/>
-                </a:schemeClr>
-              </a:solidFill>
-            </a:endParaRPr>
-          </a:p>
-          <a:p>
             <a:r>
               <a:rPr lang="de-DE" sz="2400" dirty="0"/>
               <a:t>eigenen Rechner (einzeln oder pro </a:t>
@@ -3503,6 +3601,60 @@
           </a:p>
         </p:txBody>
       </p:sp>
+      <p:pic>
+        <p:nvPicPr>
+          <p:cNvPr id="1027" name="Picture 3"/>
+          <p:cNvPicPr>
+            <a:picLocks noChangeAspect="1" noChangeArrowheads="1"/>
+          </p:cNvPicPr>
+          <p:nvPr/>
+        </p:nvPicPr>
+        <p:blipFill>
+          <a:blip r:embed="rId6">
+            <a:extLst>
+              <a:ext uri="{28A0092B-C50C-407E-A947-70E740481C1C}">
+                <a14:useLocalDpi xmlns:a14="http://schemas.microsoft.com/office/drawing/2010/main" val="0"/>
+              </a:ext>
+            </a:extLst>
+          </a:blip>
+          <a:srcRect/>
+          <a:stretch>
+            <a:fillRect/>
+          </a:stretch>
+        </p:blipFill>
+        <p:spPr bwMode="auto">
+          <a:xfrm>
+            <a:off x="7236296" y="4077072"/>
+            <a:ext cx="1019175" cy="342900"/>
+          </a:xfrm>
+          <a:prstGeom prst="rect">
+            <a:avLst/>
+          </a:prstGeom>
+          <a:noFill/>
+          <a:ln>
+            <a:noFill/>
+          </a:ln>
+          <a:extLst>
+            <a:ext uri="{909E8E84-426E-40DD-AFC4-6F175D3DCCD1}">
+              <a14:hiddenFill xmlns:a14="http://schemas.microsoft.com/office/drawing/2010/main">
+                <a:solidFill>
+                  <a:schemeClr val="accent1"/>
+                </a:solidFill>
+              </a14:hiddenFill>
+            </a:ext>
+            <a:ext uri="{91240B29-F687-4F45-9708-019B960494DF}">
+              <a14:hiddenLine xmlns:a14="http://schemas.microsoft.com/office/drawing/2010/main" w="9525">
+                <a:solidFill>
+                  <a:schemeClr val="tx1"/>
+                </a:solidFill>
+                <a:miter lim="800000"/>
+                <a:headEnd/>
+                <a:tailEnd/>
+              </a14:hiddenLine>
+            </a:ext>
+          </a:extLst>
+        </p:spPr>
+      </p:pic>
     </p:spTree>
     <p:extLst>
       <p:ext uri="{BB962C8B-B14F-4D97-AF65-F5344CB8AC3E}">
@@ -6210,7 +6362,18 @@
           <a:p>
             <a:r>
               <a:rPr lang="de-DE" sz="2800" dirty="0" smtClean="0"/>
-              <a:t>Muster am Beispiel implementieren</a:t>
+              <a:t>Muster am Beispiel </a:t>
+            </a:r>
+            <a:r>
+              <a:rPr lang="de-DE" sz="2800" dirty="0" smtClean="0"/>
+              <a:t>implementieren</a:t>
+            </a:r>
+            <a:br>
+              <a:rPr lang="de-DE" sz="2800" dirty="0" smtClean="0"/>
+            </a:br>
+            <a:r>
+              <a:rPr lang="de-DE" sz="2800" dirty="0" smtClean="0"/>
+              <a:t>(möglichst paarweise)</a:t>
             </a:r>
             <a:endParaRPr lang="de-DE" sz="2400" dirty="0" smtClean="0"/>
           </a:p>

</xml_diff>